<commit_message>
Update block diagram and note
</commit_message>
<xml_diff>
--- a/Block diagram.pptx
+++ b/Block diagram.pptx
@@ -6,6 +6,8 @@
   </p:sldMasterIdLst>
   <p:sldIdLst>
     <p:sldId id="256" r:id="rId2"/>
+    <p:sldId id="258" r:id="rId3"/>
+    <p:sldId id="257" r:id="rId4"/>
   </p:sldIdLst>
   <p:sldSz cx="12192000" cy="6858000"/>
   <p:notesSz cx="6858000" cy="9144000"/>
@@ -104,6 +106,11 @@
       </a:defRPr>
     </a:lvl9pPr>
   </p:defaultTextStyle>
+  <p:extLst>
+    <p:ext uri="{EFAFB233-063F-42B5-8137-9DF3F51BA10A}">
+      <p15:sldGuideLst xmlns:p15="http://schemas.microsoft.com/office/powerpoint/2012/main"/>
+    </p:ext>
+  </p:extLst>
 </p:presentation>
 </file>
 
@@ -3356,7 +3363,7 @@
         </p:nvSpPr>
         <p:spPr>
           <a:xfrm>
-            <a:off x="6208518" y="3136307"/>
+            <a:off x="7684092" y="3136307"/>
             <a:ext cx="1392965" cy="2486827"/>
           </a:xfrm>
           <a:prstGeom prst="rect">
@@ -3386,7 +3393,14 @@
             <a:pPr algn="ctr"/>
             <a:r>
               <a:rPr lang="en-US" dirty="0"/>
-              <a:t>32bit valve output</a:t>
+              <a:t>24bit valve output</a:t>
+            </a:r>
+          </a:p>
+          <a:p>
+            <a:pPr algn="ctr"/>
+            <a:r>
+              <a:rPr lang="en-US" dirty="0"/>
+              <a:t>74HC595</a:t>
             </a:r>
           </a:p>
         </p:txBody>
@@ -3405,7 +3419,7 @@
         </p:nvSpPr>
         <p:spPr>
           <a:xfrm>
-            <a:off x="9323461" y="3666146"/>
+            <a:off x="10799035" y="3666146"/>
             <a:ext cx="1392965" cy="1025496"/>
           </a:xfrm>
           <a:prstGeom prst="rect">
@@ -3457,7 +3471,7 @@
         </p:nvCxnSpPr>
         <p:spPr>
           <a:xfrm flipH="1">
-            <a:off x="7541663" y="4178894"/>
+            <a:off x="9017237" y="4178894"/>
             <a:ext cx="1781798" cy="0"/>
           </a:xfrm>
           <a:prstGeom prst="straightConnector1">
@@ -3496,8 +3510,8 @@
         </p:nvSpPr>
         <p:spPr>
           <a:xfrm>
-            <a:off x="7930496" y="3532563"/>
-            <a:ext cx="1239140" cy="646331"/>
+            <a:off x="9370108" y="3255564"/>
+            <a:ext cx="1239140" cy="923330"/>
           </a:xfrm>
           <a:prstGeom prst="rect">
             <a:avLst/>
@@ -3516,7 +3530,13 @@
             </a:r>
             <a:r>
               <a:rPr lang="en-US" dirty="0"/>
-              <a:t>, Ds, Latch, OE</a:t>
+              <a:t>, Ds, Latch, OE,</a:t>
+            </a:r>
+          </a:p>
+          <a:p>
+            <a:r>
+              <a:rPr lang="en-US" dirty="0"/>
+              <a:t>5V, GND</a:t>
             </a:r>
           </a:p>
         </p:txBody>
@@ -3537,7 +3557,7 @@
         </p:nvCxnSpPr>
         <p:spPr>
           <a:xfrm flipH="1">
-            <a:off x="4272897" y="4234442"/>
+            <a:off x="5748471" y="4234442"/>
             <a:ext cx="1935621" cy="0"/>
           </a:xfrm>
           <a:prstGeom prst="straightConnector1">
@@ -3576,7 +3596,7 @@
         </p:nvSpPr>
         <p:spPr>
           <a:xfrm>
-            <a:off x="4302810" y="3841046"/>
+            <a:off x="5778384" y="3841046"/>
             <a:ext cx="2038170" cy="369332"/>
           </a:xfrm>
           <a:prstGeom prst="rect">
@@ -3596,7 +3616,7 @@
             </a:r>
             <a:r>
               <a:rPr lang="en-US" dirty="0"/>
-              <a:t>[1..32]</a:t>
+              <a:t>[1..24]</a:t>
             </a:r>
           </a:p>
         </p:txBody>
@@ -3615,7 +3635,7 @@
         </p:nvSpPr>
         <p:spPr>
           <a:xfrm>
-            <a:off x="2874235" y="3136306"/>
+            <a:off x="4385419" y="3136306"/>
             <a:ext cx="1392965" cy="2486827"/>
           </a:xfrm>
           <a:prstGeom prst="rect">
@@ -3645,7 +3665,7 @@
             <a:pPr algn="ctr"/>
             <a:r>
               <a:rPr lang="en-US" dirty="0"/>
-              <a:t>32 </a:t>
+              <a:t>24 </a:t>
             </a:r>
             <a:r>
               <a:rPr lang="en-US" dirty="0" err="1"/>
@@ -3669,7 +3689,7 @@
         </p:nvSpPr>
         <p:spPr>
           <a:xfrm>
-            <a:off x="5934341" y="1361849"/>
+            <a:off x="4428371" y="1234867"/>
             <a:ext cx="1941318" cy="940038"/>
           </a:xfrm>
           <a:prstGeom prst="rect">
@@ -3706,122 +3726,6 @@
       </p:sp>
       <p:cxnSp>
         <p:nvCxnSpPr>
-          <p:cNvPr id="18" name="Đường nối Thẳng 17">
-            <a:extLst>
-              <a:ext uri="{FF2B5EF4-FFF2-40B4-BE49-F238E27FC236}">
-                <a16:creationId xmlns:a16="http://schemas.microsoft.com/office/drawing/2014/main" id="{8530CA2B-841B-A796-A6A7-A83683E432B6}"/>
-              </a:ext>
-            </a:extLst>
-          </p:cNvPr>
-          <p:cNvCxnSpPr>
-            <a:stCxn id="5" idx="0"/>
-          </p:cNvCxnSpPr>
-          <p:nvPr/>
-        </p:nvCxnSpPr>
-        <p:spPr>
-          <a:xfrm flipH="1" flipV="1">
-            <a:off x="10019943" y="1831868"/>
-            <a:ext cx="1" cy="1834278"/>
-          </a:xfrm>
-          <a:prstGeom prst="line">
-            <a:avLst/>
-          </a:prstGeom>
-          <a:ln w="57150"/>
-        </p:spPr>
-        <p:style>
-          <a:lnRef idx="1">
-            <a:schemeClr val="accent1"/>
-          </a:lnRef>
-          <a:fillRef idx="0">
-            <a:schemeClr val="accent1"/>
-          </a:fillRef>
-          <a:effectRef idx="0">
-            <a:schemeClr val="accent1"/>
-          </a:effectRef>
-          <a:fontRef idx="minor">
-            <a:schemeClr val="tx1"/>
-          </a:fontRef>
-        </p:style>
-      </p:cxnSp>
-      <p:cxnSp>
-        <p:nvCxnSpPr>
-          <p:cNvPr id="19" name="Đường kết nối Mũi tên Thẳng 18">
-            <a:extLst>
-              <a:ext uri="{FF2B5EF4-FFF2-40B4-BE49-F238E27FC236}">
-                <a16:creationId xmlns:a16="http://schemas.microsoft.com/office/drawing/2014/main" id="{4F633AAD-8EEF-43A6-2712-EE9585840EC4}"/>
-              </a:ext>
-            </a:extLst>
-          </p:cNvPr>
-          <p:cNvCxnSpPr>
-            <a:cxnSpLocks/>
-            <a:endCxn id="14" idx="3"/>
-          </p:cNvCxnSpPr>
-          <p:nvPr/>
-        </p:nvCxnSpPr>
-        <p:spPr>
-          <a:xfrm flipH="1">
-            <a:off x="7875659" y="1831868"/>
-            <a:ext cx="2144284" cy="0"/>
-          </a:xfrm>
-          <a:prstGeom prst="straightConnector1">
-            <a:avLst/>
-          </a:prstGeom>
-          <a:ln w="57150">
-            <a:tailEnd type="triangle"/>
-          </a:ln>
-        </p:spPr>
-        <p:style>
-          <a:lnRef idx="1">
-            <a:schemeClr val="accent1"/>
-          </a:lnRef>
-          <a:fillRef idx="0">
-            <a:schemeClr val="accent1"/>
-          </a:fillRef>
-          <a:effectRef idx="0">
-            <a:schemeClr val="accent1"/>
-          </a:effectRef>
-          <a:fontRef idx="minor">
-            <a:schemeClr val="tx1"/>
-          </a:fontRef>
-        </p:style>
-      </p:cxnSp>
-      <p:sp>
-        <p:nvSpPr>
-          <p:cNvPr id="21" name="Hộp Văn bản 20">
-            <a:extLst>
-              <a:ext uri="{FF2B5EF4-FFF2-40B4-BE49-F238E27FC236}">
-                <a16:creationId xmlns:a16="http://schemas.microsoft.com/office/drawing/2014/main" id="{DCB18FEE-BC02-D2AC-CFB4-CABB998CB9E6}"/>
-              </a:ext>
-            </a:extLst>
-          </p:cNvPr>
-          <p:cNvSpPr txBox="1"/>
-          <p:nvPr/>
-        </p:nvSpPr>
-        <p:spPr>
-          <a:xfrm>
-            <a:off x="8432562" y="1462535"/>
-            <a:ext cx="1239140" cy="369332"/>
-          </a:xfrm>
-          <a:prstGeom prst="rect">
-            <a:avLst/>
-          </a:prstGeom>
-          <a:noFill/>
-        </p:spPr>
-        <p:txBody>
-          <a:bodyPr wrap="square" rtlCol="0">
-            <a:spAutoFit/>
-          </a:bodyPr>
-          <a:lstStyle/>
-          <a:p>
-            <a:r>
-              <a:rPr lang="en-US" dirty="0"/>
-              <a:t>24V</a:t>
-            </a:r>
-          </a:p>
-        </p:txBody>
-      </p:sp>
-      <p:cxnSp>
-        <p:nvCxnSpPr>
           <p:cNvPr id="22" name="Đường nối Thẳng 21">
             <a:extLst>
               <a:ext uri="{FF2B5EF4-FFF2-40B4-BE49-F238E27FC236}">
@@ -3836,7 +3740,7 @@
         </p:nvCxnSpPr>
         <p:spPr>
           <a:xfrm flipH="1">
-            <a:off x="3646910" y="1895632"/>
+            <a:off x="2140940" y="1768650"/>
             <a:ext cx="2546184" cy="0"/>
           </a:xfrm>
           <a:prstGeom prst="line">
@@ -3875,7 +3779,7 @@
         </p:nvCxnSpPr>
         <p:spPr>
           <a:xfrm>
-            <a:off x="3646910" y="1895632"/>
+            <a:off x="2140940" y="1768650"/>
             <a:ext cx="0" cy="1276283"/>
           </a:xfrm>
           <a:prstGeom prst="straightConnector1">
@@ -3914,7 +3818,7 @@
         </p:nvSpPr>
         <p:spPr>
           <a:xfrm>
-            <a:off x="4497218" y="1526300"/>
+            <a:off x="2991248" y="1399318"/>
             <a:ext cx="1239140" cy="369332"/>
           </a:xfrm>
           <a:prstGeom prst="rect">
@@ -3930,7 +3834,7 @@
           <a:p>
             <a:r>
               <a:rPr lang="en-US" dirty="0"/>
-              <a:t>24V</a:t>
+              <a:t>24V Load</a:t>
             </a:r>
           </a:p>
         </p:txBody>
@@ -3950,9 +3854,9 @@
           <p:nvPr/>
         </p:nvCxnSpPr>
         <p:spPr>
-          <a:xfrm flipH="1">
-            <a:off x="1145136" y="4211503"/>
-            <a:ext cx="1794616" cy="0"/>
+          <a:xfrm flipH="1" flipV="1">
+            <a:off x="42899" y="4224614"/>
+            <a:ext cx="1496866" cy="32609"/>
           </a:xfrm>
           <a:prstGeom prst="straightConnector1">
             <a:avLst/>
@@ -3990,8 +3894,8 @@
         </p:nvSpPr>
         <p:spPr>
           <a:xfrm>
-            <a:off x="1311786" y="3877640"/>
-            <a:ext cx="2038170" cy="369332"/>
+            <a:off x="155353" y="3923360"/>
+            <a:ext cx="1794616" cy="369332"/>
           </a:xfrm>
           <a:prstGeom prst="rect">
             <a:avLst/>
@@ -4012,10 +3916,1641 @@
           </a:p>
         </p:txBody>
       </p:sp>
+      <p:sp>
+        <p:nvSpPr>
+          <p:cNvPr id="3" name="Hình chữ nhật 2">
+            <a:extLst>
+              <a:ext uri="{FF2B5EF4-FFF2-40B4-BE49-F238E27FC236}">
+                <a16:creationId xmlns:a16="http://schemas.microsoft.com/office/drawing/2014/main" id="{5D103AB5-60EA-8938-5954-5F64366B78E4}"/>
+              </a:ext>
+            </a:extLst>
+          </p:cNvPr>
+          <p:cNvSpPr/>
+          <p:nvPr/>
+        </p:nvSpPr>
+        <p:spPr>
+          <a:xfrm>
+            <a:off x="1507690" y="3003558"/>
+            <a:ext cx="1392965" cy="2486827"/>
+          </a:xfrm>
+          <a:prstGeom prst="rect">
+            <a:avLst/>
+          </a:prstGeom>
+        </p:spPr>
+        <p:style>
+          <a:lnRef idx="2">
+            <a:schemeClr val="accent1">
+              <a:shade val="15000"/>
+            </a:schemeClr>
+          </a:lnRef>
+          <a:fillRef idx="1">
+            <a:schemeClr val="accent1"/>
+          </a:fillRef>
+          <a:effectRef idx="0">
+            <a:schemeClr val="accent1"/>
+          </a:effectRef>
+          <a:fontRef idx="minor">
+            <a:schemeClr val="lt1"/>
+          </a:fontRef>
+        </p:style>
+        <p:txBody>
+          <a:bodyPr rtlCol="0" anchor="ctr"/>
+          <a:lstStyle/>
+          <a:p>
+            <a:pPr algn="ctr"/>
+            <a:r>
+              <a:rPr lang="en-US" dirty="0"/>
+              <a:t>24 </a:t>
+            </a:r>
+            <a:r>
+              <a:rPr lang="en-US" dirty="0" err="1"/>
+              <a:t>Mosfet</a:t>
+            </a:r>
+            <a:endParaRPr lang="en-US" dirty="0"/>
+          </a:p>
+        </p:txBody>
+      </p:sp>
+      <p:cxnSp>
+        <p:nvCxnSpPr>
+          <p:cNvPr id="6" name="Đường kết nối Mũi tên Thẳng 5">
+            <a:extLst>
+              <a:ext uri="{FF2B5EF4-FFF2-40B4-BE49-F238E27FC236}">
+                <a16:creationId xmlns:a16="http://schemas.microsoft.com/office/drawing/2014/main" id="{613002B5-A879-3790-0A0D-9F588E7AE04D}"/>
+              </a:ext>
+            </a:extLst>
+          </p:cNvPr>
+          <p:cNvCxnSpPr>
+            <a:cxnSpLocks/>
+          </p:cNvCxnSpPr>
+          <p:nvPr/>
+        </p:nvCxnSpPr>
+        <p:spPr>
+          <a:xfrm flipH="1" flipV="1">
+            <a:off x="2889611" y="4295482"/>
+            <a:ext cx="1496866" cy="32609"/>
+          </a:xfrm>
+          <a:prstGeom prst="straightConnector1">
+            <a:avLst/>
+          </a:prstGeom>
+          <a:ln w="57150">
+            <a:tailEnd type="triangle"/>
+          </a:ln>
+        </p:spPr>
+        <p:style>
+          <a:lnRef idx="1">
+            <a:schemeClr val="accent1"/>
+          </a:lnRef>
+          <a:fillRef idx="0">
+            <a:schemeClr val="accent1"/>
+          </a:fillRef>
+          <a:effectRef idx="0">
+            <a:schemeClr val="accent1"/>
+          </a:effectRef>
+          <a:fontRef idx="minor">
+            <a:schemeClr val="tx1"/>
+          </a:fontRef>
+        </p:style>
+      </p:cxnSp>
+      <p:sp>
+        <p:nvSpPr>
+          <p:cNvPr id="9" name="Hộp Văn bản 8">
+            <a:extLst>
+              <a:ext uri="{FF2B5EF4-FFF2-40B4-BE49-F238E27FC236}">
+                <a16:creationId xmlns:a16="http://schemas.microsoft.com/office/drawing/2014/main" id="{6A4EDADF-7B36-4357-C16D-A1AD492DCC97}"/>
+              </a:ext>
+            </a:extLst>
+          </p:cNvPr>
+          <p:cNvSpPr txBox="1"/>
+          <p:nvPr/>
+        </p:nvSpPr>
+        <p:spPr>
+          <a:xfrm>
+            <a:off x="3002065" y="3994228"/>
+            <a:ext cx="1794616" cy="369332"/>
+          </a:xfrm>
+          <a:prstGeom prst="rect">
+            <a:avLst/>
+          </a:prstGeom>
+          <a:noFill/>
+        </p:spPr>
+        <p:txBody>
+          <a:bodyPr wrap="square" rtlCol="0">
+            <a:spAutoFit/>
+          </a:bodyPr>
+          <a:lstStyle/>
+          <a:p>
+            <a:r>
+              <a:rPr lang="en-US" dirty="0" err="1"/>
+              <a:t>ValveOutSig</a:t>
+            </a:r>
+            <a:endParaRPr lang="en-US" dirty="0"/>
+          </a:p>
+        </p:txBody>
+      </p:sp>
+      <p:cxnSp>
+        <p:nvCxnSpPr>
+          <p:cNvPr id="12" name="Đường kết nối Mũi tên Thẳng 11">
+            <a:extLst>
+              <a:ext uri="{FF2B5EF4-FFF2-40B4-BE49-F238E27FC236}">
+                <a16:creationId xmlns:a16="http://schemas.microsoft.com/office/drawing/2014/main" id="{2CDE1C01-9032-3438-876E-8AAEDB850496}"/>
+              </a:ext>
+            </a:extLst>
+          </p:cNvPr>
+          <p:cNvCxnSpPr>
+            <a:cxnSpLocks/>
+            <a:endCxn id="13" idx="0"/>
+          </p:cNvCxnSpPr>
+          <p:nvPr/>
+        </p:nvCxnSpPr>
+        <p:spPr>
+          <a:xfrm>
+            <a:off x="5079770" y="2174905"/>
+            <a:ext cx="2132" cy="961401"/>
+          </a:xfrm>
+          <a:prstGeom prst="straightConnector1">
+            <a:avLst/>
+          </a:prstGeom>
+          <a:ln w="57150">
+            <a:tailEnd type="triangle"/>
+          </a:ln>
+        </p:spPr>
+        <p:style>
+          <a:lnRef idx="1">
+            <a:schemeClr val="accent1"/>
+          </a:lnRef>
+          <a:fillRef idx="0">
+            <a:schemeClr val="accent1"/>
+          </a:fillRef>
+          <a:effectRef idx="0">
+            <a:schemeClr val="accent1"/>
+          </a:effectRef>
+          <a:fontRef idx="minor">
+            <a:schemeClr val="tx1"/>
+          </a:fontRef>
+        </p:style>
+      </p:cxnSp>
+      <p:sp>
+        <p:nvSpPr>
+          <p:cNvPr id="17" name="Hộp Văn bản 16">
+            <a:extLst>
+              <a:ext uri="{FF2B5EF4-FFF2-40B4-BE49-F238E27FC236}">
+                <a16:creationId xmlns:a16="http://schemas.microsoft.com/office/drawing/2014/main" id="{D92447B7-9450-A7F6-D8CF-5989C1860B67}"/>
+              </a:ext>
+            </a:extLst>
+          </p:cNvPr>
+          <p:cNvSpPr txBox="1"/>
+          <p:nvPr/>
+        </p:nvSpPr>
+        <p:spPr>
+          <a:xfrm>
+            <a:off x="5044160" y="2438892"/>
+            <a:ext cx="1239140" cy="369332"/>
+          </a:xfrm>
+          <a:prstGeom prst="rect">
+            <a:avLst/>
+          </a:prstGeom>
+          <a:noFill/>
+        </p:spPr>
+        <p:txBody>
+          <a:bodyPr wrap="square" rtlCol="0">
+            <a:spAutoFit/>
+          </a:bodyPr>
+          <a:lstStyle/>
+          <a:p>
+            <a:r>
+              <a:rPr lang="en-US" dirty="0"/>
+              <a:t>5V Load</a:t>
+            </a:r>
+          </a:p>
+        </p:txBody>
+      </p:sp>
+      <p:sp>
+        <p:nvSpPr>
+          <p:cNvPr id="20" name="Hộp Văn bản 19">
+            <a:extLst>
+              <a:ext uri="{FF2B5EF4-FFF2-40B4-BE49-F238E27FC236}">
+                <a16:creationId xmlns:a16="http://schemas.microsoft.com/office/drawing/2014/main" id="{D6967551-E26C-5C37-BC66-EF2BB53CFFA9}"/>
+              </a:ext>
+            </a:extLst>
+          </p:cNvPr>
+          <p:cNvSpPr txBox="1"/>
+          <p:nvPr/>
+        </p:nvSpPr>
+        <p:spPr>
+          <a:xfrm>
+            <a:off x="10902299" y="2750436"/>
+            <a:ext cx="1239140" cy="646331"/>
+          </a:xfrm>
+          <a:prstGeom prst="rect">
+            <a:avLst/>
+          </a:prstGeom>
+          <a:noFill/>
+        </p:spPr>
+        <p:txBody>
+          <a:bodyPr wrap="square" rtlCol="0">
+            <a:spAutoFit/>
+          </a:bodyPr>
+          <a:lstStyle/>
+          <a:p>
+            <a:r>
+              <a:rPr lang="en-US" dirty="0"/>
+              <a:t>Jack XH 2.54</a:t>
+            </a:r>
+          </a:p>
+        </p:txBody>
+      </p:sp>
+      <p:sp>
+        <p:nvSpPr>
+          <p:cNvPr id="24" name="Hộp Văn bản 23">
+            <a:extLst>
+              <a:ext uri="{FF2B5EF4-FFF2-40B4-BE49-F238E27FC236}">
+                <a16:creationId xmlns:a16="http://schemas.microsoft.com/office/drawing/2014/main" id="{15769729-F264-2FCF-B898-F2C405A79E94}"/>
+              </a:ext>
+            </a:extLst>
+          </p:cNvPr>
+          <p:cNvSpPr txBox="1"/>
+          <p:nvPr/>
+        </p:nvSpPr>
+        <p:spPr>
+          <a:xfrm>
+            <a:off x="4422720" y="635113"/>
+            <a:ext cx="2351460" cy="646331"/>
+          </a:xfrm>
+          <a:prstGeom prst="rect">
+            <a:avLst/>
+          </a:prstGeom>
+          <a:noFill/>
+        </p:spPr>
+        <p:txBody>
+          <a:bodyPr wrap="square" rtlCol="0">
+            <a:spAutoFit/>
+          </a:bodyPr>
+          <a:lstStyle/>
+          <a:p>
+            <a:r>
+              <a:rPr lang="en-US" dirty="0"/>
+              <a:t>Jack VH 3.96 (QUY ĐỊNH CHIỀU)</a:t>
+            </a:r>
+          </a:p>
+        </p:txBody>
+      </p:sp>
+      <p:sp>
+        <p:nvSpPr>
+          <p:cNvPr id="25" name="Hộp Văn bản 24">
+            <a:extLst>
+              <a:ext uri="{FF2B5EF4-FFF2-40B4-BE49-F238E27FC236}">
+                <a16:creationId xmlns:a16="http://schemas.microsoft.com/office/drawing/2014/main" id="{73AE4300-3996-0E4A-34C3-9CB5B4BBB607}"/>
+              </a:ext>
+            </a:extLst>
+          </p:cNvPr>
+          <p:cNvSpPr txBox="1"/>
+          <p:nvPr/>
+        </p:nvSpPr>
+        <p:spPr>
+          <a:xfrm>
+            <a:off x="343612" y="3427656"/>
+            <a:ext cx="1239140" cy="646331"/>
+          </a:xfrm>
+          <a:prstGeom prst="rect">
+            <a:avLst/>
+          </a:prstGeom>
+          <a:noFill/>
+        </p:spPr>
+        <p:txBody>
+          <a:bodyPr wrap="square" rtlCol="0">
+            <a:spAutoFit/>
+          </a:bodyPr>
+          <a:lstStyle/>
+          <a:p>
+            <a:r>
+              <a:rPr lang="en-US" dirty="0"/>
+              <a:t>Jack XH 2.54</a:t>
+            </a:r>
+          </a:p>
+        </p:txBody>
+      </p:sp>
+      <p:sp>
+        <p:nvSpPr>
+          <p:cNvPr id="28" name="Hộp Văn bản 27">
+            <a:extLst>
+              <a:ext uri="{FF2B5EF4-FFF2-40B4-BE49-F238E27FC236}">
+                <a16:creationId xmlns:a16="http://schemas.microsoft.com/office/drawing/2014/main" id="{668A280F-DF8D-3941-9498-BEDF855E1420}"/>
+              </a:ext>
+            </a:extLst>
+          </p:cNvPr>
+          <p:cNvSpPr txBox="1"/>
+          <p:nvPr/>
+        </p:nvSpPr>
+        <p:spPr>
+          <a:xfrm>
+            <a:off x="8252352" y="388618"/>
+            <a:ext cx="3311568" cy="1077218"/>
+          </a:xfrm>
+          <a:prstGeom prst="rect">
+            <a:avLst/>
+          </a:prstGeom>
+          <a:noFill/>
+        </p:spPr>
+        <p:txBody>
+          <a:bodyPr wrap="square" rtlCol="0">
+            <a:spAutoFit/>
+          </a:bodyPr>
+          <a:lstStyle/>
+          <a:p>
+            <a:r>
+              <a:rPr lang="en-US" sz="3200" dirty="0"/>
+              <a:t>TẤT CẢ JACK ĐƯA XUỐNG MẶT DƯỚI</a:t>
+            </a:r>
+          </a:p>
+        </p:txBody>
+      </p:sp>
+      <p:sp>
+        <p:nvSpPr>
+          <p:cNvPr id="32" name="Hình Bầu dục 31">
+            <a:extLst>
+              <a:ext uri="{FF2B5EF4-FFF2-40B4-BE49-F238E27FC236}">
+                <a16:creationId xmlns:a16="http://schemas.microsoft.com/office/drawing/2014/main" id="{9C24AAB7-E942-DD79-5E09-43070DB9DB0C}"/>
+              </a:ext>
+            </a:extLst>
+          </p:cNvPr>
+          <p:cNvSpPr/>
+          <p:nvPr/>
+        </p:nvSpPr>
+        <p:spPr>
+          <a:xfrm>
+            <a:off x="155352" y="259080"/>
+            <a:ext cx="1863947" cy="754380"/>
+          </a:xfrm>
+          <a:prstGeom prst="ellipse">
+            <a:avLst/>
+          </a:prstGeom>
+        </p:spPr>
+        <p:style>
+          <a:lnRef idx="2">
+            <a:schemeClr val="accent1">
+              <a:shade val="15000"/>
+            </a:schemeClr>
+          </a:lnRef>
+          <a:fillRef idx="1">
+            <a:schemeClr val="accent1"/>
+          </a:fillRef>
+          <a:effectRef idx="0">
+            <a:schemeClr val="accent1"/>
+          </a:effectRef>
+          <a:fontRef idx="minor">
+            <a:schemeClr val="lt1"/>
+          </a:fontRef>
+        </p:style>
+        <p:txBody>
+          <a:bodyPr rtlCol="0" anchor="ctr"/>
+          <a:lstStyle/>
+          <a:p>
+            <a:pPr algn="ctr"/>
+            <a:r>
+              <a:rPr lang="en-US" dirty="0"/>
+              <a:t>HƯỚNG 1</a:t>
+            </a:r>
+          </a:p>
+        </p:txBody>
+      </p:sp>
     </p:spTree>
     <p:extLst>
       <p:ext uri="{BB962C8B-B14F-4D97-AF65-F5344CB8AC3E}">
         <p14:creationId xmlns:p14="http://schemas.microsoft.com/office/powerpoint/2010/main" val="3650572166"/>
+      </p:ext>
+    </p:extLst>
+  </p:cSld>
+  <p:clrMapOvr>
+    <a:masterClrMapping/>
+  </p:clrMapOvr>
+</p:sld>
+</file>
+
+<file path=ppt/slides/slide2.xml><?xml version="1.0" encoding="utf-8"?>
+<p:sld xmlns:a="http://schemas.openxmlformats.org/drawingml/2006/main" xmlns:r="http://schemas.openxmlformats.org/officeDocument/2006/relationships" xmlns:p="http://schemas.openxmlformats.org/presentationml/2006/main">
+  <p:cSld>
+    <p:spTree>
+      <p:nvGrpSpPr>
+        <p:cNvPr id="1" name=""/>
+        <p:cNvGrpSpPr/>
+        <p:nvPr/>
+      </p:nvGrpSpPr>
+      <p:grpSpPr>
+        <a:xfrm>
+          <a:off x="0" y="0"/>
+          <a:ext cx="0" cy="0"/>
+          <a:chOff x="0" y="0"/>
+          <a:chExt cx="0" cy="0"/>
+        </a:xfrm>
+      </p:grpSpPr>
+      <p:sp>
+        <p:nvSpPr>
+          <p:cNvPr id="4" name="Hình chữ nhật 3">
+            <a:extLst>
+              <a:ext uri="{FF2B5EF4-FFF2-40B4-BE49-F238E27FC236}">
+                <a16:creationId xmlns:a16="http://schemas.microsoft.com/office/drawing/2014/main" id="{E4DE4436-328A-3BFB-EE9A-C9F416ABFD2D}"/>
+              </a:ext>
+            </a:extLst>
+          </p:cNvPr>
+          <p:cNvSpPr/>
+          <p:nvPr/>
+        </p:nvSpPr>
+        <p:spPr>
+          <a:xfrm>
+            <a:off x="5877496" y="3073601"/>
+            <a:ext cx="1392965" cy="2486827"/>
+          </a:xfrm>
+          <a:prstGeom prst="rect">
+            <a:avLst/>
+          </a:prstGeom>
+        </p:spPr>
+        <p:style>
+          <a:lnRef idx="2">
+            <a:schemeClr val="accent1">
+              <a:shade val="15000"/>
+            </a:schemeClr>
+          </a:lnRef>
+          <a:fillRef idx="1">
+            <a:schemeClr val="accent1"/>
+          </a:fillRef>
+          <a:effectRef idx="0">
+            <a:schemeClr val="accent1"/>
+          </a:effectRef>
+          <a:fontRef idx="minor">
+            <a:schemeClr val="lt1"/>
+          </a:fontRef>
+        </p:style>
+        <p:txBody>
+          <a:bodyPr rtlCol="0" anchor="ctr"/>
+          <a:lstStyle/>
+          <a:p>
+            <a:pPr algn="ctr"/>
+            <a:r>
+              <a:rPr lang="en-US" dirty="0"/>
+              <a:t>24bit valve output</a:t>
+            </a:r>
+          </a:p>
+          <a:p>
+            <a:pPr algn="ctr"/>
+            <a:r>
+              <a:rPr lang="en-US" dirty="0"/>
+              <a:t>74HC595</a:t>
+            </a:r>
+          </a:p>
+        </p:txBody>
+      </p:sp>
+      <p:sp>
+        <p:nvSpPr>
+          <p:cNvPr id="5" name="Hình chữ nhật 4">
+            <a:extLst>
+              <a:ext uri="{FF2B5EF4-FFF2-40B4-BE49-F238E27FC236}">
+                <a16:creationId xmlns:a16="http://schemas.microsoft.com/office/drawing/2014/main" id="{7BB62990-0C0D-03B6-1F4E-9F4045BED93D}"/>
+              </a:ext>
+            </a:extLst>
+          </p:cNvPr>
+          <p:cNvSpPr/>
+          <p:nvPr/>
+        </p:nvSpPr>
+        <p:spPr>
+          <a:xfrm>
+            <a:off x="10799035" y="3666146"/>
+            <a:ext cx="1392965" cy="1025496"/>
+          </a:xfrm>
+          <a:prstGeom prst="rect">
+            <a:avLst/>
+          </a:prstGeom>
+        </p:spPr>
+        <p:style>
+          <a:lnRef idx="2">
+            <a:schemeClr val="accent1">
+              <a:shade val="15000"/>
+            </a:schemeClr>
+          </a:lnRef>
+          <a:fillRef idx="1">
+            <a:schemeClr val="accent1"/>
+          </a:fillRef>
+          <a:effectRef idx="0">
+            <a:schemeClr val="accent1"/>
+          </a:effectRef>
+          <a:fontRef idx="minor">
+            <a:schemeClr val="lt1"/>
+          </a:fontRef>
+        </p:style>
+        <p:txBody>
+          <a:bodyPr rtlCol="0" anchor="ctr"/>
+          <a:lstStyle/>
+          <a:p>
+            <a:pPr algn="ctr"/>
+            <a:r>
+              <a:rPr lang="en-US" dirty="0"/>
+              <a:t>Output from main</a:t>
+            </a:r>
+          </a:p>
+        </p:txBody>
+      </p:sp>
+      <p:cxnSp>
+        <p:nvCxnSpPr>
+          <p:cNvPr id="7" name="Đường kết nối Mũi tên Thẳng 6">
+            <a:extLst>
+              <a:ext uri="{FF2B5EF4-FFF2-40B4-BE49-F238E27FC236}">
+                <a16:creationId xmlns:a16="http://schemas.microsoft.com/office/drawing/2014/main" id="{12BEF66B-D5F3-CEDF-6EF7-9485D958426F}"/>
+              </a:ext>
+            </a:extLst>
+          </p:cNvPr>
+          <p:cNvCxnSpPr>
+            <a:cxnSpLocks/>
+            <a:stCxn id="5" idx="1"/>
+            <a:endCxn id="31" idx="3"/>
+          </p:cNvCxnSpPr>
+          <p:nvPr/>
+        </p:nvCxnSpPr>
+        <p:spPr>
+          <a:xfrm flipH="1">
+            <a:off x="9516633" y="4178894"/>
+            <a:ext cx="1282402" cy="0"/>
+          </a:xfrm>
+          <a:prstGeom prst="straightConnector1">
+            <a:avLst/>
+          </a:prstGeom>
+          <a:ln w="57150">
+            <a:tailEnd type="triangle"/>
+          </a:ln>
+        </p:spPr>
+        <p:style>
+          <a:lnRef idx="1">
+            <a:schemeClr val="accent1"/>
+          </a:lnRef>
+          <a:fillRef idx="0">
+            <a:schemeClr val="accent1"/>
+          </a:fillRef>
+          <a:effectRef idx="0">
+            <a:schemeClr val="accent1"/>
+          </a:effectRef>
+          <a:fontRef idx="minor">
+            <a:schemeClr val="tx1"/>
+          </a:fontRef>
+        </p:style>
+      </p:cxnSp>
+      <p:sp>
+        <p:nvSpPr>
+          <p:cNvPr id="8" name="Hộp Văn bản 7">
+            <a:extLst>
+              <a:ext uri="{FF2B5EF4-FFF2-40B4-BE49-F238E27FC236}">
+                <a16:creationId xmlns:a16="http://schemas.microsoft.com/office/drawing/2014/main" id="{98FE537E-6D97-FD78-1C82-BAC070D56472}"/>
+              </a:ext>
+            </a:extLst>
+          </p:cNvPr>
+          <p:cNvSpPr txBox="1"/>
+          <p:nvPr/>
+        </p:nvSpPr>
+        <p:spPr>
+          <a:xfrm>
+            <a:off x="9663159" y="3259770"/>
+            <a:ext cx="1239140" cy="923330"/>
+          </a:xfrm>
+          <a:prstGeom prst="rect">
+            <a:avLst/>
+          </a:prstGeom>
+          <a:noFill/>
+        </p:spPr>
+        <p:txBody>
+          <a:bodyPr wrap="square" rtlCol="0">
+            <a:spAutoFit/>
+          </a:bodyPr>
+          <a:lstStyle/>
+          <a:p>
+            <a:r>
+              <a:rPr lang="en-US" dirty="0" err="1"/>
+              <a:t>Clk</a:t>
+            </a:r>
+            <a:r>
+              <a:rPr lang="en-US" dirty="0"/>
+              <a:t>, Ds, Latch, OE,</a:t>
+            </a:r>
+          </a:p>
+          <a:p>
+            <a:r>
+              <a:rPr lang="en-US" dirty="0"/>
+              <a:t>5V, GND</a:t>
+            </a:r>
+          </a:p>
+        </p:txBody>
+      </p:sp>
+      <p:cxnSp>
+        <p:nvCxnSpPr>
+          <p:cNvPr id="10" name="Đường kết nối Mũi tên Thẳng 9">
+            <a:extLst>
+              <a:ext uri="{FF2B5EF4-FFF2-40B4-BE49-F238E27FC236}">
+                <a16:creationId xmlns:a16="http://schemas.microsoft.com/office/drawing/2014/main" id="{E3353466-DE52-475A-CAEB-A9E7AE4A551A}"/>
+              </a:ext>
+            </a:extLst>
+          </p:cNvPr>
+          <p:cNvCxnSpPr>
+            <a:cxnSpLocks/>
+            <a:endCxn id="3" idx="3"/>
+          </p:cNvCxnSpPr>
+          <p:nvPr/>
+        </p:nvCxnSpPr>
+        <p:spPr>
+          <a:xfrm flipH="1">
+            <a:off x="2900655" y="4240918"/>
+            <a:ext cx="3355365" cy="6054"/>
+          </a:xfrm>
+          <a:prstGeom prst="straightConnector1">
+            <a:avLst/>
+          </a:prstGeom>
+          <a:ln w="57150">
+            <a:tailEnd type="triangle"/>
+          </a:ln>
+        </p:spPr>
+        <p:style>
+          <a:lnRef idx="1">
+            <a:schemeClr val="accent1"/>
+          </a:lnRef>
+          <a:fillRef idx="0">
+            <a:schemeClr val="accent1"/>
+          </a:fillRef>
+          <a:effectRef idx="0">
+            <a:schemeClr val="accent1"/>
+          </a:effectRef>
+          <a:fontRef idx="minor">
+            <a:schemeClr val="tx1"/>
+          </a:fontRef>
+        </p:style>
+      </p:cxnSp>
+      <p:sp>
+        <p:nvSpPr>
+          <p:cNvPr id="11" name="Hộp Văn bản 10">
+            <a:extLst>
+              <a:ext uri="{FF2B5EF4-FFF2-40B4-BE49-F238E27FC236}">
+                <a16:creationId xmlns:a16="http://schemas.microsoft.com/office/drawing/2014/main" id="{08C3D553-3ECF-89D9-7FD7-8AF8A7AD3E49}"/>
+              </a:ext>
+            </a:extLst>
+          </p:cNvPr>
+          <p:cNvSpPr txBox="1"/>
+          <p:nvPr/>
+        </p:nvSpPr>
+        <p:spPr>
+          <a:xfrm>
+            <a:off x="3610818" y="3871585"/>
+            <a:ext cx="2038170" cy="369332"/>
+          </a:xfrm>
+          <a:prstGeom prst="rect">
+            <a:avLst/>
+          </a:prstGeom>
+          <a:noFill/>
+        </p:spPr>
+        <p:txBody>
+          <a:bodyPr wrap="square" rtlCol="0">
+            <a:spAutoFit/>
+          </a:bodyPr>
+          <a:lstStyle/>
+          <a:p>
+            <a:r>
+              <a:rPr lang="en-US" dirty="0" err="1"/>
+              <a:t>ValveBit_out</a:t>
+            </a:r>
+            <a:r>
+              <a:rPr lang="en-US" dirty="0"/>
+              <a:t>[1..24]</a:t>
+            </a:r>
+          </a:p>
+        </p:txBody>
+      </p:sp>
+      <p:sp>
+        <p:nvSpPr>
+          <p:cNvPr id="14" name="Hình chữ nhật 13">
+            <a:extLst>
+              <a:ext uri="{FF2B5EF4-FFF2-40B4-BE49-F238E27FC236}">
+                <a16:creationId xmlns:a16="http://schemas.microsoft.com/office/drawing/2014/main" id="{586027C1-B1D4-C462-5132-8C1F2F5157A2}"/>
+              </a:ext>
+            </a:extLst>
+          </p:cNvPr>
+          <p:cNvSpPr/>
+          <p:nvPr/>
+        </p:nvSpPr>
+        <p:spPr>
+          <a:xfrm>
+            <a:off x="4453301" y="1221477"/>
+            <a:ext cx="1941318" cy="940038"/>
+          </a:xfrm>
+          <a:prstGeom prst="rect">
+            <a:avLst/>
+          </a:prstGeom>
+        </p:spPr>
+        <p:style>
+          <a:lnRef idx="2">
+            <a:schemeClr val="accent1">
+              <a:shade val="15000"/>
+            </a:schemeClr>
+          </a:lnRef>
+          <a:fillRef idx="1">
+            <a:schemeClr val="accent1"/>
+          </a:fillRef>
+          <a:effectRef idx="0">
+            <a:schemeClr val="accent1"/>
+          </a:effectRef>
+          <a:fontRef idx="minor">
+            <a:schemeClr val="lt1"/>
+          </a:fontRef>
+        </p:style>
+        <p:txBody>
+          <a:bodyPr rtlCol="0" anchor="ctr"/>
+          <a:lstStyle/>
+          <a:p>
+            <a:pPr algn="ctr"/>
+            <a:r>
+              <a:rPr lang="en-US" dirty="0"/>
+              <a:t>Power</a:t>
+            </a:r>
+          </a:p>
+        </p:txBody>
+      </p:sp>
+      <p:cxnSp>
+        <p:nvCxnSpPr>
+          <p:cNvPr id="22" name="Đường nối Thẳng 21">
+            <a:extLst>
+              <a:ext uri="{FF2B5EF4-FFF2-40B4-BE49-F238E27FC236}">
+                <a16:creationId xmlns:a16="http://schemas.microsoft.com/office/drawing/2014/main" id="{C2BE22AA-C322-969B-3CFC-9E9B3E6EEA27}"/>
+              </a:ext>
+            </a:extLst>
+          </p:cNvPr>
+          <p:cNvCxnSpPr>
+            <a:cxnSpLocks/>
+          </p:cNvCxnSpPr>
+          <p:nvPr/>
+        </p:nvCxnSpPr>
+        <p:spPr>
+          <a:xfrm flipH="1">
+            <a:off x="2140940" y="1768650"/>
+            <a:ext cx="2546184" cy="0"/>
+          </a:xfrm>
+          <a:prstGeom prst="line">
+            <a:avLst/>
+          </a:prstGeom>
+          <a:ln w="57150"/>
+        </p:spPr>
+        <p:style>
+          <a:lnRef idx="1">
+            <a:schemeClr val="accent1"/>
+          </a:lnRef>
+          <a:fillRef idx="0">
+            <a:schemeClr val="accent1"/>
+          </a:fillRef>
+          <a:effectRef idx="0">
+            <a:schemeClr val="accent1"/>
+          </a:effectRef>
+          <a:fontRef idx="minor">
+            <a:schemeClr val="tx1"/>
+          </a:fontRef>
+        </p:style>
+      </p:cxnSp>
+      <p:cxnSp>
+        <p:nvCxnSpPr>
+          <p:cNvPr id="23" name="Đường kết nối Mũi tên Thẳng 22">
+            <a:extLst>
+              <a:ext uri="{FF2B5EF4-FFF2-40B4-BE49-F238E27FC236}">
+                <a16:creationId xmlns:a16="http://schemas.microsoft.com/office/drawing/2014/main" id="{833416DE-4388-7532-CEFD-4FE4846CC457}"/>
+              </a:ext>
+            </a:extLst>
+          </p:cNvPr>
+          <p:cNvCxnSpPr>
+            <a:cxnSpLocks/>
+          </p:cNvCxnSpPr>
+          <p:nvPr/>
+        </p:nvCxnSpPr>
+        <p:spPr>
+          <a:xfrm>
+            <a:off x="2140940" y="1768650"/>
+            <a:ext cx="0" cy="1276283"/>
+          </a:xfrm>
+          <a:prstGeom prst="straightConnector1">
+            <a:avLst/>
+          </a:prstGeom>
+          <a:ln w="57150">
+            <a:tailEnd type="triangle"/>
+          </a:ln>
+        </p:spPr>
+        <p:style>
+          <a:lnRef idx="1">
+            <a:schemeClr val="accent1"/>
+          </a:lnRef>
+          <a:fillRef idx="0">
+            <a:schemeClr val="accent1"/>
+          </a:fillRef>
+          <a:effectRef idx="0">
+            <a:schemeClr val="accent1"/>
+          </a:effectRef>
+          <a:fontRef idx="minor">
+            <a:schemeClr val="tx1"/>
+          </a:fontRef>
+        </p:style>
+      </p:cxnSp>
+      <p:sp>
+        <p:nvSpPr>
+          <p:cNvPr id="27" name="Hộp Văn bản 26">
+            <a:extLst>
+              <a:ext uri="{FF2B5EF4-FFF2-40B4-BE49-F238E27FC236}">
+                <a16:creationId xmlns:a16="http://schemas.microsoft.com/office/drawing/2014/main" id="{2232EC94-B5E8-2E01-377C-93A5D1E25817}"/>
+              </a:ext>
+            </a:extLst>
+          </p:cNvPr>
+          <p:cNvSpPr txBox="1"/>
+          <p:nvPr/>
+        </p:nvSpPr>
+        <p:spPr>
+          <a:xfrm>
+            <a:off x="2991248" y="1399318"/>
+            <a:ext cx="1239140" cy="369332"/>
+          </a:xfrm>
+          <a:prstGeom prst="rect">
+            <a:avLst/>
+          </a:prstGeom>
+          <a:noFill/>
+        </p:spPr>
+        <p:txBody>
+          <a:bodyPr wrap="square" rtlCol="0">
+            <a:spAutoFit/>
+          </a:bodyPr>
+          <a:lstStyle/>
+          <a:p>
+            <a:r>
+              <a:rPr lang="en-US" dirty="0"/>
+              <a:t>24V Load</a:t>
+            </a:r>
+          </a:p>
+        </p:txBody>
+      </p:sp>
+      <p:cxnSp>
+        <p:nvCxnSpPr>
+          <p:cNvPr id="29" name="Đường kết nối Mũi tên Thẳng 28">
+            <a:extLst>
+              <a:ext uri="{FF2B5EF4-FFF2-40B4-BE49-F238E27FC236}">
+                <a16:creationId xmlns:a16="http://schemas.microsoft.com/office/drawing/2014/main" id="{7802C226-635B-1565-B560-553D9279989C}"/>
+              </a:ext>
+            </a:extLst>
+          </p:cNvPr>
+          <p:cNvCxnSpPr>
+            <a:cxnSpLocks/>
+          </p:cNvCxnSpPr>
+          <p:nvPr/>
+        </p:nvCxnSpPr>
+        <p:spPr>
+          <a:xfrm flipH="1" flipV="1">
+            <a:off x="42899" y="4224614"/>
+            <a:ext cx="1496866" cy="32609"/>
+          </a:xfrm>
+          <a:prstGeom prst="straightConnector1">
+            <a:avLst/>
+          </a:prstGeom>
+          <a:ln w="57150">
+            <a:tailEnd type="triangle"/>
+          </a:ln>
+        </p:spPr>
+        <p:style>
+          <a:lnRef idx="1">
+            <a:schemeClr val="accent1"/>
+          </a:lnRef>
+          <a:fillRef idx="0">
+            <a:schemeClr val="accent1"/>
+          </a:fillRef>
+          <a:effectRef idx="0">
+            <a:schemeClr val="accent1"/>
+          </a:effectRef>
+          <a:fontRef idx="minor">
+            <a:schemeClr val="tx1"/>
+          </a:fontRef>
+        </p:style>
+      </p:cxnSp>
+      <p:sp>
+        <p:nvSpPr>
+          <p:cNvPr id="30" name="Hộp Văn bản 29">
+            <a:extLst>
+              <a:ext uri="{FF2B5EF4-FFF2-40B4-BE49-F238E27FC236}">
+                <a16:creationId xmlns:a16="http://schemas.microsoft.com/office/drawing/2014/main" id="{497A7CA2-9125-7234-6807-BC0F489E7EE1}"/>
+              </a:ext>
+            </a:extLst>
+          </p:cNvPr>
+          <p:cNvSpPr txBox="1"/>
+          <p:nvPr/>
+        </p:nvSpPr>
+        <p:spPr>
+          <a:xfrm>
+            <a:off x="155353" y="3923360"/>
+            <a:ext cx="1794616" cy="369332"/>
+          </a:xfrm>
+          <a:prstGeom prst="rect">
+            <a:avLst/>
+          </a:prstGeom>
+          <a:noFill/>
+        </p:spPr>
+        <p:txBody>
+          <a:bodyPr wrap="square" rtlCol="0">
+            <a:spAutoFit/>
+          </a:bodyPr>
+          <a:lstStyle/>
+          <a:p>
+            <a:r>
+              <a:rPr lang="en-US" dirty="0" err="1"/>
+              <a:t>ValveOutput</a:t>
+            </a:r>
+            <a:endParaRPr lang="en-US" dirty="0"/>
+          </a:p>
+        </p:txBody>
+      </p:sp>
+      <p:sp>
+        <p:nvSpPr>
+          <p:cNvPr id="3" name="Hình chữ nhật 2">
+            <a:extLst>
+              <a:ext uri="{FF2B5EF4-FFF2-40B4-BE49-F238E27FC236}">
+                <a16:creationId xmlns:a16="http://schemas.microsoft.com/office/drawing/2014/main" id="{5D103AB5-60EA-8938-5954-5F64366B78E4}"/>
+              </a:ext>
+            </a:extLst>
+          </p:cNvPr>
+          <p:cNvSpPr/>
+          <p:nvPr/>
+        </p:nvSpPr>
+        <p:spPr>
+          <a:xfrm>
+            <a:off x="1507690" y="3003558"/>
+            <a:ext cx="1392965" cy="2486827"/>
+          </a:xfrm>
+          <a:prstGeom prst="rect">
+            <a:avLst/>
+          </a:prstGeom>
+        </p:spPr>
+        <p:style>
+          <a:lnRef idx="2">
+            <a:schemeClr val="accent1">
+              <a:shade val="15000"/>
+            </a:schemeClr>
+          </a:lnRef>
+          <a:fillRef idx="1">
+            <a:schemeClr val="accent1"/>
+          </a:fillRef>
+          <a:effectRef idx="0">
+            <a:schemeClr val="accent1"/>
+          </a:effectRef>
+          <a:fontRef idx="minor">
+            <a:schemeClr val="lt1"/>
+          </a:fontRef>
+        </p:style>
+        <p:txBody>
+          <a:bodyPr rtlCol="0" anchor="ctr"/>
+          <a:lstStyle/>
+          <a:p>
+            <a:pPr algn="ctr"/>
+            <a:r>
+              <a:rPr lang="en-US" dirty="0"/>
+              <a:t>24 </a:t>
+            </a:r>
+            <a:r>
+              <a:rPr lang="en-US" dirty="0" err="1"/>
+              <a:t>Mosfet</a:t>
+            </a:r>
+            <a:endParaRPr lang="en-US" dirty="0"/>
+          </a:p>
+        </p:txBody>
+      </p:sp>
+      <p:sp>
+        <p:nvSpPr>
+          <p:cNvPr id="20" name="Hộp Văn bản 19">
+            <a:extLst>
+              <a:ext uri="{FF2B5EF4-FFF2-40B4-BE49-F238E27FC236}">
+                <a16:creationId xmlns:a16="http://schemas.microsoft.com/office/drawing/2014/main" id="{D6967551-E26C-5C37-BC66-EF2BB53CFFA9}"/>
+              </a:ext>
+            </a:extLst>
+          </p:cNvPr>
+          <p:cNvSpPr txBox="1"/>
+          <p:nvPr/>
+        </p:nvSpPr>
+        <p:spPr>
+          <a:xfrm>
+            <a:off x="10902299" y="2750436"/>
+            <a:ext cx="1239140" cy="646331"/>
+          </a:xfrm>
+          <a:prstGeom prst="rect">
+            <a:avLst/>
+          </a:prstGeom>
+          <a:noFill/>
+        </p:spPr>
+        <p:txBody>
+          <a:bodyPr wrap="square" rtlCol="0">
+            <a:spAutoFit/>
+          </a:bodyPr>
+          <a:lstStyle/>
+          <a:p>
+            <a:r>
+              <a:rPr lang="en-US" dirty="0"/>
+              <a:t>Jack XH 2.54</a:t>
+            </a:r>
+          </a:p>
+        </p:txBody>
+      </p:sp>
+      <p:sp>
+        <p:nvSpPr>
+          <p:cNvPr id="24" name="Hộp Văn bản 23">
+            <a:extLst>
+              <a:ext uri="{FF2B5EF4-FFF2-40B4-BE49-F238E27FC236}">
+                <a16:creationId xmlns:a16="http://schemas.microsoft.com/office/drawing/2014/main" id="{15769729-F264-2FCF-B898-F2C405A79E94}"/>
+              </a:ext>
+            </a:extLst>
+          </p:cNvPr>
+          <p:cNvSpPr txBox="1"/>
+          <p:nvPr/>
+        </p:nvSpPr>
+        <p:spPr>
+          <a:xfrm>
+            <a:off x="4422720" y="635113"/>
+            <a:ext cx="2351460" cy="646331"/>
+          </a:xfrm>
+          <a:prstGeom prst="rect">
+            <a:avLst/>
+          </a:prstGeom>
+          <a:noFill/>
+        </p:spPr>
+        <p:txBody>
+          <a:bodyPr wrap="square" rtlCol="0">
+            <a:spAutoFit/>
+          </a:bodyPr>
+          <a:lstStyle/>
+          <a:p>
+            <a:r>
+              <a:rPr lang="en-US" dirty="0"/>
+              <a:t>Jack VH 3.96 (QUY ĐỊNH CHIỀU)</a:t>
+            </a:r>
+          </a:p>
+        </p:txBody>
+      </p:sp>
+      <p:sp>
+        <p:nvSpPr>
+          <p:cNvPr id="25" name="Hộp Văn bản 24">
+            <a:extLst>
+              <a:ext uri="{FF2B5EF4-FFF2-40B4-BE49-F238E27FC236}">
+                <a16:creationId xmlns:a16="http://schemas.microsoft.com/office/drawing/2014/main" id="{73AE4300-3996-0E4A-34C3-9CB5B4BBB607}"/>
+              </a:ext>
+            </a:extLst>
+          </p:cNvPr>
+          <p:cNvSpPr txBox="1"/>
+          <p:nvPr/>
+        </p:nvSpPr>
+        <p:spPr>
+          <a:xfrm>
+            <a:off x="343612" y="3427656"/>
+            <a:ext cx="1239140" cy="646331"/>
+          </a:xfrm>
+          <a:prstGeom prst="rect">
+            <a:avLst/>
+          </a:prstGeom>
+          <a:noFill/>
+        </p:spPr>
+        <p:txBody>
+          <a:bodyPr wrap="square" rtlCol="0">
+            <a:spAutoFit/>
+          </a:bodyPr>
+          <a:lstStyle/>
+          <a:p>
+            <a:r>
+              <a:rPr lang="en-US" dirty="0"/>
+              <a:t>Jack XH 2.54</a:t>
+            </a:r>
+          </a:p>
+        </p:txBody>
+      </p:sp>
+      <p:sp>
+        <p:nvSpPr>
+          <p:cNvPr id="28" name="Hộp Văn bản 27">
+            <a:extLst>
+              <a:ext uri="{FF2B5EF4-FFF2-40B4-BE49-F238E27FC236}">
+                <a16:creationId xmlns:a16="http://schemas.microsoft.com/office/drawing/2014/main" id="{668A280F-DF8D-3941-9498-BEDF855E1420}"/>
+              </a:ext>
+            </a:extLst>
+          </p:cNvPr>
+          <p:cNvSpPr txBox="1"/>
+          <p:nvPr/>
+        </p:nvSpPr>
+        <p:spPr>
+          <a:xfrm>
+            <a:off x="8252352" y="388618"/>
+            <a:ext cx="3939648" cy="1077218"/>
+          </a:xfrm>
+          <a:prstGeom prst="rect">
+            <a:avLst/>
+          </a:prstGeom>
+          <a:noFill/>
+        </p:spPr>
+        <p:txBody>
+          <a:bodyPr wrap="square" rtlCol="0">
+            <a:spAutoFit/>
+          </a:bodyPr>
+          <a:lstStyle/>
+          <a:p>
+            <a:r>
+              <a:rPr lang="en-US" sz="3200" dirty="0"/>
+              <a:t>TẤT CẢ JACK ĐƯA XUỐNG MẶT DƯỚI</a:t>
+            </a:r>
+          </a:p>
+        </p:txBody>
+      </p:sp>
+      <p:sp>
+        <p:nvSpPr>
+          <p:cNvPr id="31" name="Hình chữ nhật 30">
+            <a:extLst>
+              <a:ext uri="{FF2B5EF4-FFF2-40B4-BE49-F238E27FC236}">
+                <a16:creationId xmlns:a16="http://schemas.microsoft.com/office/drawing/2014/main" id="{462A6853-3E19-AEF3-60BC-A5ED087F5A4C}"/>
+              </a:ext>
+            </a:extLst>
+          </p:cNvPr>
+          <p:cNvSpPr/>
+          <p:nvPr/>
+        </p:nvSpPr>
+        <p:spPr>
+          <a:xfrm>
+            <a:off x="8072961" y="3721435"/>
+            <a:ext cx="1443672" cy="914917"/>
+          </a:xfrm>
+          <a:prstGeom prst="rect">
+            <a:avLst/>
+          </a:prstGeom>
+        </p:spPr>
+        <p:style>
+          <a:lnRef idx="2">
+            <a:schemeClr val="accent1">
+              <a:shade val="15000"/>
+            </a:schemeClr>
+          </a:lnRef>
+          <a:fillRef idx="1">
+            <a:schemeClr val="accent1"/>
+          </a:fillRef>
+          <a:effectRef idx="0">
+            <a:schemeClr val="accent1"/>
+          </a:effectRef>
+          <a:fontRef idx="minor">
+            <a:schemeClr val="lt1"/>
+          </a:fontRef>
+        </p:style>
+        <p:txBody>
+          <a:bodyPr rtlCol="0" anchor="ctr"/>
+          <a:lstStyle/>
+          <a:p>
+            <a:pPr algn="ctr"/>
+            <a:r>
+              <a:rPr lang="en-US" dirty="0"/>
+              <a:t> </a:t>
+            </a:r>
+            <a:r>
+              <a:rPr lang="en-US" dirty="0" err="1"/>
+              <a:t>Opto</a:t>
+            </a:r>
+            <a:endParaRPr lang="en-US" dirty="0"/>
+          </a:p>
+          <a:p>
+            <a:pPr algn="ctr"/>
+            <a:r>
+              <a:rPr lang="en-US" dirty="0"/>
+              <a:t>HIGH FREQUENCY</a:t>
+            </a:r>
+          </a:p>
+        </p:txBody>
+      </p:sp>
+      <p:sp>
+        <p:nvSpPr>
+          <p:cNvPr id="32" name="Hình Bầu dục 31">
+            <a:extLst>
+              <a:ext uri="{FF2B5EF4-FFF2-40B4-BE49-F238E27FC236}">
+                <a16:creationId xmlns:a16="http://schemas.microsoft.com/office/drawing/2014/main" id="{9C24AAB7-E942-DD79-5E09-43070DB9DB0C}"/>
+              </a:ext>
+            </a:extLst>
+          </p:cNvPr>
+          <p:cNvSpPr/>
+          <p:nvPr/>
+        </p:nvSpPr>
+        <p:spPr>
+          <a:xfrm>
+            <a:off x="155352" y="259080"/>
+            <a:ext cx="1863947" cy="754380"/>
+          </a:xfrm>
+          <a:prstGeom prst="ellipse">
+            <a:avLst/>
+          </a:prstGeom>
+        </p:spPr>
+        <p:style>
+          <a:lnRef idx="2">
+            <a:schemeClr val="accent1">
+              <a:shade val="15000"/>
+            </a:schemeClr>
+          </a:lnRef>
+          <a:fillRef idx="1">
+            <a:schemeClr val="accent1"/>
+          </a:fillRef>
+          <a:effectRef idx="0">
+            <a:schemeClr val="accent1"/>
+          </a:effectRef>
+          <a:fontRef idx="minor">
+            <a:schemeClr val="lt1"/>
+          </a:fontRef>
+        </p:style>
+        <p:txBody>
+          <a:bodyPr rtlCol="0" anchor="ctr"/>
+          <a:lstStyle/>
+          <a:p>
+            <a:pPr algn="ctr"/>
+            <a:r>
+              <a:rPr lang="en-US" dirty="0"/>
+              <a:t>HƯỚNG 2</a:t>
+            </a:r>
+          </a:p>
+        </p:txBody>
+      </p:sp>
+      <p:cxnSp>
+        <p:nvCxnSpPr>
+          <p:cNvPr id="18" name="Đường kết nối Mũi tên Thẳng 17">
+            <a:extLst>
+              <a:ext uri="{FF2B5EF4-FFF2-40B4-BE49-F238E27FC236}">
+                <a16:creationId xmlns:a16="http://schemas.microsoft.com/office/drawing/2014/main" id="{AE335876-3F30-6422-81E7-8D75640D8079}"/>
+              </a:ext>
+            </a:extLst>
+          </p:cNvPr>
+          <p:cNvCxnSpPr>
+            <a:cxnSpLocks/>
+          </p:cNvCxnSpPr>
+          <p:nvPr/>
+        </p:nvCxnSpPr>
+        <p:spPr>
+          <a:xfrm>
+            <a:off x="6338944" y="2114560"/>
+            <a:ext cx="2132" cy="961401"/>
+          </a:xfrm>
+          <a:prstGeom prst="straightConnector1">
+            <a:avLst/>
+          </a:prstGeom>
+          <a:ln w="57150">
+            <a:tailEnd type="triangle"/>
+          </a:ln>
+        </p:spPr>
+        <p:style>
+          <a:lnRef idx="1">
+            <a:schemeClr val="accent1"/>
+          </a:lnRef>
+          <a:fillRef idx="0">
+            <a:schemeClr val="accent1"/>
+          </a:fillRef>
+          <a:effectRef idx="0">
+            <a:schemeClr val="accent1"/>
+          </a:effectRef>
+          <a:fontRef idx="minor">
+            <a:schemeClr val="tx1"/>
+          </a:fontRef>
+        </p:style>
+      </p:cxnSp>
+      <p:sp>
+        <p:nvSpPr>
+          <p:cNvPr id="19" name="Hộp Văn bản 18">
+            <a:extLst>
+              <a:ext uri="{FF2B5EF4-FFF2-40B4-BE49-F238E27FC236}">
+                <a16:creationId xmlns:a16="http://schemas.microsoft.com/office/drawing/2014/main" id="{3EF82A02-C802-E254-4918-63DB086847BF}"/>
+              </a:ext>
+            </a:extLst>
+          </p:cNvPr>
+          <p:cNvSpPr txBox="1"/>
+          <p:nvPr/>
+        </p:nvSpPr>
+        <p:spPr>
+          <a:xfrm>
+            <a:off x="6338944" y="2462552"/>
+            <a:ext cx="1239140" cy="369332"/>
+          </a:xfrm>
+          <a:prstGeom prst="rect">
+            <a:avLst/>
+          </a:prstGeom>
+          <a:noFill/>
+        </p:spPr>
+        <p:txBody>
+          <a:bodyPr wrap="square" rtlCol="0">
+            <a:spAutoFit/>
+          </a:bodyPr>
+          <a:lstStyle/>
+          <a:p>
+            <a:r>
+              <a:rPr lang="en-US" dirty="0"/>
+              <a:t>5V Load</a:t>
+            </a:r>
+          </a:p>
+        </p:txBody>
+      </p:sp>
+      <p:cxnSp>
+        <p:nvCxnSpPr>
+          <p:cNvPr id="34" name="Đường kết nối Mũi tên Thẳng 33">
+            <a:extLst>
+              <a:ext uri="{FF2B5EF4-FFF2-40B4-BE49-F238E27FC236}">
+                <a16:creationId xmlns:a16="http://schemas.microsoft.com/office/drawing/2014/main" id="{4E2F02EF-79C8-4A19-3304-BDEA4F6E6AC7}"/>
+              </a:ext>
+            </a:extLst>
+          </p:cNvPr>
+          <p:cNvCxnSpPr>
+            <a:cxnSpLocks/>
+          </p:cNvCxnSpPr>
+          <p:nvPr/>
+        </p:nvCxnSpPr>
+        <p:spPr>
+          <a:xfrm flipH="1">
+            <a:off x="7270461" y="4217451"/>
+            <a:ext cx="802500" cy="0"/>
+          </a:xfrm>
+          <a:prstGeom prst="straightConnector1">
+            <a:avLst/>
+          </a:prstGeom>
+          <a:ln w="57150">
+            <a:tailEnd type="triangle"/>
+          </a:ln>
+        </p:spPr>
+        <p:style>
+          <a:lnRef idx="1">
+            <a:schemeClr val="accent1"/>
+          </a:lnRef>
+          <a:fillRef idx="0">
+            <a:schemeClr val="accent1"/>
+          </a:fillRef>
+          <a:effectRef idx="0">
+            <a:schemeClr val="accent1"/>
+          </a:effectRef>
+          <a:fontRef idx="minor">
+            <a:schemeClr val="tx1"/>
+          </a:fontRef>
+        </p:style>
+      </p:cxnSp>
+      <p:cxnSp>
+        <p:nvCxnSpPr>
+          <p:cNvPr id="42" name="Đường kết nối Mũi tên Thẳng 41">
+            <a:extLst>
+              <a:ext uri="{FF2B5EF4-FFF2-40B4-BE49-F238E27FC236}">
+                <a16:creationId xmlns:a16="http://schemas.microsoft.com/office/drawing/2014/main" id="{4ED42C2C-4447-C69B-BC09-ABF4CC503B60}"/>
+              </a:ext>
+            </a:extLst>
+          </p:cNvPr>
+          <p:cNvCxnSpPr>
+            <a:cxnSpLocks/>
+          </p:cNvCxnSpPr>
+          <p:nvPr/>
+        </p:nvCxnSpPr>
+        <p:spPr>
+          <a:xfrm>
+            <a:off x="8789949" y="1754220"/>
+            <a:ext cx="2132" cy="1969266"/>
+          </a:xfrm>
+          <a:prstGeom prst="straightConnector1">
+            <a:avLst/>
+          </a:prstGeom>
+          <a:ln w="57150">
+            <a:tailEnd type="triangle"/>
+          </a:ln>
+        </p:spPr>
+        <p:style>
+          <a:lnRef idx="1">
+            <a:schemeClr val="accent1"/>
+          </a:lnRef>
+          <a:fillRef idx="0">
+            <a:schemeClr val="accent1"/>
+          </a:fillRef>
+          <a:effectRef idx="0">
+            <a:schemeClr val="accent1"/>
+          </a:effectRef>
+          <a:fontRef idx="minor">
+            <a:schemeClr val="tx1"/>
+          </a:fontRef>
+        </p:style>
+      </p:cxnSp>
+      <p:sp>
+        <p:nvSpPr>
+          <p:cNvPr id="43" name="Hộp Văn bản 42">
+            <a:extLst>
+              <a:ext uri="{FF2B5EF4-FFF2-40B4-BE49-F238E27FC236}">
+                <a16:creationId xmlns:a16="http://schemas.microsoft.com/office/drawing/2014/main" id="{2026986A-90E0-1649-D193-DF5335691880}"/>
+              </a:ext>
+            </a:extLst>
+          </p:cNvPr>
+          <p:cNvSpPr txBox="1"/>
+          <p:nvPr/>
+        </p:nvSpPr>
+        <p:spPr>
+          <a:xfrm>
+            <a:off x="8789949" y="3110077"/>
+            <a:ext cx="1239140" cy="369332"/>
+          </a:xfrm>
+          <a:prstGeom prst="rect">
+            <a:avLst/>
+          </a:prstGeom>
+          <a:noFill/>
+        </p:spPr>
+        <p:txBody>
+          <a:bodyPr wrap="square" rtlCol="0">
+            <a:spAutoFit/>
+          </a:bodyPr>
+          <a:lstStyle/>
+          <a:p>
+            <a:r>
+              <a:rPr lang="en-US" dirty="0"/>
+              <a:t>5V Load</a:t>
+            </a:r>
+          </a:p>
+        </p:txBody>
+      </p:sp>
+      <p:cxnSp>
+        <p:nvCxnSpPr>
+          <p:cNvPr id="45" name="Đường nối Thẳng 44">
+            <a:extLst>
+              <a:ext uri="{FF2B5EF4-FFF2-40B4-BE49-F238E27FC236}">
+                <a16:creationId xmlns:a16="http://schemas.microsoft.com/office/drawing/2014/main" id="{B5F26AAC-C114-F122-5CC4-F0A633592A7B}"/>
+              </a:ext>
+            </a:extLst>
+          </p:cNvPr>
+          <p:cNvCxnSpPr>
+            <a:cxnSpLocks/>
+          </p:cNvCxnSpPr>
+          <p:nvPr/>
+        </p:nvCxnSpPr>
+        <p:spPr>
+          <a:xfrm flipH="1">
+            <a:off x="6243765" y="1754220"/>
+            <a:ext cx="2546184" cy="0"/>
+          </a:xfrm>
+          <a:prstGeom prst="line">
+            <a:avLst/>
+          </a:prstGeom>
+          <a:ln w="57150"/>
+        </p:spPr>
+        <p:style>
+          <a:lnRef idx="1">
+            <a:schemeClr val="accent1"/>
+          </a:lnRef>
+          <a:fillRef idx="0">
+            <a:schemeClr val="accent1"/>
+          </a:fillRef>
+          <a:effectRef idx="0">
+            <a:schemeClr val="accent1"/>
+          </a:effectRef>
+          <a:fontRef idx="minor">
+            <a:schemeClr val="tx1"/>
+          </a:fontRef>
+        </p:style>
+      </p:cxnSp>
+    </p:spTree>
+    <p:extLst>
+      <p:ext uri="{BB962C8B-B14F-4D97-AF65-F5344CB8AC3E}">
+        <p14:creationId xmlns:p14="http://schemas.microsoft.com/office/powerpoint/2010/main" val="3660468954"/>
+      </p:ext>
+    </p:extLst>
+  </p:cSld>
+  <p:clrMapOvr>
+    <a:masterClrMapping/>
+  </p:clrMapOvr>
+</p:sld>
+</file>
+
+<file path=ppt/slides/slide3.xml><?xml version="1.0" encoding="utf-8"?>
+<p:sld xmlns:a="http://schemas.openxmlformats.org/drawingml/2006/main" xmlns:r="http://schemas.openxmlformats.org/officeDocument/2006/relationships" xmlns:p="http://schemas.openxmlformats.org/presentationml/2006/main">
+  <p:cSld>
+    <p:spTree>
+      <p:nvGrpSpPr>
+        <p:cNvPr id="1" name=""/>
+        <p:cNvGrpSpPr/>
+        <p:nvPr/>
+      </p:nvGrpSpPr>
+      <p:grpSpPr>
+        <a:xfrm>
+          <a:off x="0" y="0"/>
+          <a:ext cx="0" cy="0"/>
+          <a:chOff x="0" y="0"/>
+          <a:chExt cx="0" cy="0"/>
+        </a:xfrm>
+      </p:grpSpPr>
+      <p:sp>
+        <p:nvSpPr>
+          <p:cNvPr id="2" name="Tiêu đề 1">
+            <a:extLst>
+              <a:ext uri="{FF2B5EF4-FFF2-40B4-BE49-F238E27FC236}">
+                <a16:creationId xmlns:a16="http://schemas.microsoft.com/office/drawing/2014/main" id="{7C9D9B1D-9A10-D653-26E9-2D86C75DC50C}"/>
+              </a:ext>
+            </a:extLst>
+          </p:cNvPr>
+          <p:cNvSpPr>
+            <a:spLocks noGrp="1"/>
+          </p:cNvSpPr>
+          <p:nvPr>
+            <p:ph type="title"/>
+          </p:nvPr>
+        </p:nvSpPr>
+        <p:spPr>
+          <a:xfrm>
+            <a:off x="838200" y="365125"/>
+            <a:ext cx="8389620" cy="823595"/>
+          </a:xfrm>
+        </p:spPr>
+        <p:txBody>
+          <a:bodyPr/>
+          <a:lstStyle/>
+          <a:p>
+            <a:r>
+              <a:rPr lang="en-US" dirty="0"/>
+              <a:t>QUY ĐỊNH CHIỀU JACK VH 3.96</a:t>
+            </a:r>
+          </a:p>
+        </p:txBody>
+      </p:sp>
+      <p:pic>
+        <p:nvPicPr>
+          <p:cNvPr id="5" name="Hình ảnh 4">
+            <a:extLst>
+              <a:ext uri="{FF2B5EF4-FFF2-40B4-BE49-F238E27FC236}">
+                <a16:creationId xmlns:a16="http://schemas.microsoft.com/office/drawing/2014/main" id="{9082C4F4-B0D1-F371-FD1C-4D820FC191A4}"/>
+              </a:ext>
+            </a:extLst>
+          </p:cNvPr>
+          <p:cNvPicPr>
+            <a:picLocks noChangeAspect="1"/>
+          </p:cNvPicPr>
+          <p:nvPr/>
+        </p:nvPicPr>
+        <p:blipFill>
+          <a:blip r:embed="rId2"/>
+          <a:stretch>
+            <a:fillRect/>
+          </a:stretch>
+        </p:blipFill>
+        <p:spPr>
+          <a:xfrm>
+            <a:off x="173873" y="1013460"/>
+            <a:ext cx="4537471" cy="4530523"/>
+          </a:xfrm>
+          <a:prstGeom prst="rect">
+            <a:avLst/>
+          </a:prstGeom>
+        </p:spPr>
+      </p:pic>
+      <p:pic>
+        <p:nvPicPr>
+          <p:cNvPr id="7" name="Hình ảnh 6">
+            <a:extLst>
+              <a:ext uri="{FF2B5EF4-FFF2-40B4-BE49-F238E27FC236}">
+                <a16:creationId xmlns:a16="http://schemas.microsoft.com/office/drawing/2014/main" id="{82FD14A2-CB98-3F52-D6A7-CC3B782D5E2C}"/>
+              </a:ext>
+            </a:extLst>
+          </p:cNvPr>
+          <p:cNvPicPr>
+            <a:picLocks noChangeAspect="1"/>
+          </p:cNvPicPr>
+          <p:nvPr/>
+        </p:nvPicPr>
+        <p:blipFill>
+          <a:blip r:embed="rId3"/>
+          <a:stretch>
+            <a:fillRect/>
+          </a:stretch>
+        </p:blipFill>
+        <p:spPr>
+          <a:xfrm>
+            <a:off x="4635593" y="1429453"/>
+            <a:ext cx="3210373" cy="3572374"/>
+          </a:xfrm>
+          <a:prstGeom prst="rect">
+            <a:avLst/>
+          </a:prstGeom>
+        </p:spPr>
+      </p:pic>
+      <p:pic>
+        <p:nvPicPr>
+          <p:cNvPr id="9" name="Hình ảnh 8">
+            <a:extLst>
+              <a:ext uri="{FF2B5EF4-FFF2-40B4-BE49-F238E27FC236}">
+                <a16:creationId xmlns:a16="http://schemas.microsoft.com/office/drawing/2014/main" id="{CD6A3FD9-4359-4602-D4D9-CE975B109B43}"/>
+              </a:ext>
+            </a:extLst>
+          </p:cNvPr>
+          <p:cNvPicPr>
+            <a:picLocks noChangeAspect="1"/>
+          </p:cNvPicPr>
+          <p:nvPr/>
+        </p:nvPicPr>
+        <p:blipFill>
+          <a:blip r:embed="rId4"/>
+          <a:stretch>
+            <a:fillRect/>
+          </a:stretch>
+        </p:blipFill>
+        <p:spPr>
+          <a:xfrm>
+            <a:off x="8107303" y="1472321"/>
+            <a:ext cx="3910824" cy="3486637"/>
+          </a:xfrm>
+          <a:prstGeom prst="rect">
+            <a:avLst/>
+          </a:prstGeom>
+        </p:spPr>
+      </p:pic>
+    </p:spTree>
+    <p:extLst>
+      <p:ext uri="{BB962C8B-B14F-4D97-AF65-F5344CB8AC3E}">
+        <p14:creationId xmlns:p14="http://schemas.microsoft.com/office/powerpoint/2010/main" val="1321130542"/>
       </p:ext>
     </p:extLst>
   </p:cSld>

</xml_diff>